<commit_message>
update to week 7
</commit_message>
<xml_diff>
--- a/week6/week6_slides.pptx
+++ b/week6/week6_slides.pptx
@@ -6626,8 +6626,8 @@
         </p:nvSpPr>
         <p:spPr>
           <a:xfrm>
-            <a:off x="4348163" y="2402840"/>
-            <a:ext cx="5067300" cy="1076325"/>
+            <a:off x="4214178" y="2648585"/>
+            <a:ext cx="5067300" cy="583565"/>
           </a:xfrm>
           <a:prstGeom prst="rect">
             <a:avLst/>
@@ -6654,29 +6654,7 @@
                 <a:latin typeface="Microsoft YaHei" panose="020B0503020204020204" pitchFamily="34" charset="-122"/>
                 <a:ea typeface="Microsoft YaHei" panose="020B0503020204020204" pitchFamily="34" charset="-122"/>
               </a:rPr>
-              <a:t>Two Pointers &amp; </a:t>
-            </a:r>
-            <a:endParaRPr lang="en-US" altLang="zh-CN" sz="3200" b="1" dirty="0">
-              <a:solidFill>
-                <a:srgbClr val="05B780"/>
-              </a:solidFill>
-              <a:latin typeface="Microsoft YaHei" panose="020B0503020204020204" pitchFamily="34" charset="-122"/>
-              <a:ea typeface="Microsoft YaHei" panose="020B0503020204020204" pitchFamily="34" charset="-122"/>
-            </a:endParaRPr>
-          </a:p>
-          <a:p>
-            <a:pPr>
-              <a:buFont typeface="Arial" panose="020B0604020202020204" pitchFamily="34" charset="0"/>
-            </a:pPr>
-            <a:r>
-              <a:rPr lang="en-US" altLang="zh-CN" sz="3200" b="1" dirty="0">
-                <a:solidFill>
-                  <a:srgbClr val="05B780"/>
-                </a:solidFill>
-                <a:latin typeface="Microsoft YaHei" panose="020B0503020204020204" pitchFamily="34" charset="-122"/>
-                <a:ea typeface="Microsoft YaHei" panose="020B0503020204020204" pitchFamily="34" charset="-122"/>
-              </a:rPr>
-              <a:t>Sliding Window</a:t>
+              <a:t>Two Pointers</a:t>
             </a:r>
             <a:endParaRPr lang="en-US" altLang="zh-CN" sz="3200" b="1" dirty="0">
               <a:solidFill>
@@ -7171,6 +7149,14 @@
             <a:endParaRPr lang="en-US" sz="3200" b="1" dirty="0"/>
           </a:p>
           <a:p>
+            <a:pPr lvl="1"/>
+            <a:r>
+              <a:rPr lang="en-CA" altLang="en-US" sz="2740" dirty="0"/>
+              <a:t>The typical loop (ie for i in range...) is one pointer</a:t>
+            </a:r>
+            <a:endParaRPr lang="en-US" sz="2740" b="1" dirty="0"/>
+          </a:p>
+          <a:p>
             <a:r>
               <a:rPr lang="en-US" sz="3200" dirty="0"/>
               <a:t>It’s actually more of a paradigm than an algorithm, since there is no singular way to implement it</a:t>
@@ -7178,7 +7164,23 @@
             <a:endParaRPr lang="en-US" sz="3200" dirty="0"/>
           </a:p>
           <a:p>
-            <a:endParaRPr lang="en-US" sz="3200" dirty="0"/>
+            <a:r>
+              <a:rPr lang="en-CA" altLang="en-US" sz="3200" dirty="0"/>
+              <a:t>Typically this is used to </a:t>
+            </a:r>
+            <a:r>
+              <a:rPr lang="en-CA" altLang="en-US" sz="3200" b="1" dirty="0"/>
+              <a:t>search for pairs</a:t>
+            </a:r>
+            <a:r>
+              <a:rPr lang="en-CA" altLang="en-US" sz="3200" dirty="0"/>
+              <a:t> in a </a:t>
+            </a:r>
+            <a:r>
+              <a:rPr lang="en-CA" altLang="en-US" sz="3200" b="1" dirty="0"/>
+              <a:t>sorted array</a:t>
+            </a:r>
+            <a:endParaRPr lang="en-CA" altLang="en-US" sz="3200" b="1" dirty="0"/>
           </a:p>
         </p:txBody>
       </p:sp>
@@ -7875,7 +7877,50 @@
           <a:bodyPr/>
           <a:lstStyle/>
           <a:p>
-            <a:endParaRPr lang="en-US" sz="3200" dirty="0"/>
+            <a:r>
+              <a:rPr lang="en-CA" altLang="en-US" sz="3200" dirty="0"/>
+              <a:t>Sometimes known as the fast/slow pointers algorithm</a:t>
+            </a:r>
+            <a:endParaRPr lang="en-CA" altLang="en-US" sz="3200" dirty="0"/>
+          </a:p>
+          <a:p>
+            <a:r>
+              <a:rPr lang="en-CA" altLang="en-US" sz="3200" dirty="0"/>
+              <a:t>We setup two pointers that are initialized at the first element where:</a:t>
+            </a:r>
+            <a:endParaRPr lang="en-CA" altLang="en-US" sz="3200" dirty="0"/>
+          </a:p>
+          <a:p>
+            <a:pPr lvl="1"/>
+            <a:r>
+              <a:rPr lang="en-CA" altLang="en-US" sz="2740" dirty="0"/>
+              <a:t>P1 moves forward n steps every iteration</a:t>
+            </a:r>
+            <a:endParaRPr lang="en-CA" altLang="en-US" sz="2740" dirty="0"/>
+          </a:p>
+          <a:p>
+            <a:pPr lvl="2"/>
+            <a:r>
+              <a:rPr lang="en-CA" altLang="en-US" sz="2280" dirty="0"/>
+              <a:t>This is the primary iteration step (often n=1)</a:t>
+            </a:r>
+            <a:endParaRPr lang="en-CA" altLang="en-US" sz="2280" dirty="0"/>
+          </a:p>
+          <a:p>
+            <a:pPr lvl="1"/>
+            <a:r>
+              <a:rPr lang="en-CA" altLang="en-US" sz="2740" dirty="0"/>
+              <a:t>P2 moves forward m steps every m iterations</a:t>
+            </a:r>
+            <a:endParaRPr lang="en-CA" altLang="en-US" sz="2740" dirty="0"/>
+          </a:p>
+          <a:p>
+            <a:pPr lvl="2"/>
+            <a:r>
+              <a:rPr lang="en-CA" altLang="en-US" sz="2280" dirty="0"/>
+              <a:t>Only move P2 forward if some condition is met</a:t>
+            </a:r>
+            <a:endParaRPr lang="en-CA" altLang="en-US" sz="2280" dirty="0"/>
           </a:p>
         </p:txBody>
       </p:sp>
@@ -8211,7 +8256,43 @@
           <a:bodyPr/>
           <a:lstStyle/>
           <a:p>
-            <a:endParaRPr lang="en-US" sz="3200" dirty="0"/>
+            <a:r>
+              <a:rPr lang="en-CA" altLang="en-US" sz="3200" dirty="0"/>
+              <a:t>Two pointers are initialized at opposite ends of an array</a:t>
+            </a:r>
+            <a:endParaRPr lang="en-CA" altLang="en-US" sz="3200" dirty="0"/>
+          </a:p>
+          <a:p>
+            <a:pPr lvl="1"/>
+            <a:r>
+              <a:rPr lang="en-CA" altLang="en-US" sz="2740" dirty="0"/>
+              <a:t>P1 starts at index 0</a:t>
+            </a:r>
+            <a:endParaRPr lang="en-CA" altLang="en-US" sz="2740" dirty="0"/>
+          </a:p>
+          <a:p>
+            <a:pPr lvl="2"/>
+            <a:r>
+              <a:rPr lang="en-CA" altLang="en-US" sz="2280" dirty="0"/>
+              <a:t>moves forward n steps at each iteration</a:t>
+            </a:r>
+            <a:endParaRPr lang="en-CA" altLang="en-US" sz="2280" dirty="0"/>
+          </a:p>
+          <a:p>
+            <a:pPr lvl="1"/>
+            <a:r>
+              <a:rPr lang="en-CA" altLang="en-US" sz="2740" dirty="0"/>
+              <a:t>P2 starts at last index (usually found by calling len(array))</a:t>
+            </a:r>
+            <a:endParaRPr lang="en-CA" altLang="en-US" sz="2740" dirty="0"/>
+          </a:p>
+          <a:p>
+            <a:pPr lvl="2"/>
+            <a:r>
+              <a:rPr lang="en-CA" altLang="en-US" sz="2280" dirty="0"/>
+              <a:t>moves backward m steps at each iteration</a:t>
+            </a:r>
+            <a:endParaRPr lang="en-CA" altLang="en-US" sz="2280" dirty="0"/>
           </a:p>
         </p:txBody>
       </p:sp>
@@ -8547,7 +8628,43 @@
           <a:bodyPr/>
           <a:lstStyle/>
           <a:p>
-            <a:endParaRPr lang="en-US" sz="3200" dirty="0"/>
+            <a:r>
+              <a:rPr lang="en-CA" altLang="en-US" sz="3200" dirty="0"/>
+              <a:t>Variation of the two pointers same direction technique</a:t>
+            </a:r>
+            <a:endParaRPr lang="en-CA" altLang="en-US" sz="3200" dirty="0"/>
+          </a:p>
+          <a:p>
+            <a:pPr lvl="1"/>
+            <a:r>
+              <a:rPr lang="en-CA" altLang="en-US" sz="2740" dirty="0"/>
+              <a:t>A sliding window is defined by two pointers moving in the same direction</a:t>
+            </a:r>
+            <a:endParaRPr lang="en-CA" altLang="en-US" sz="2740" dirty="0"/>
+          </a:p>
+          <a:p>
+            <a:pPr lvl="1"/>
+            <a:r>
+              <a:rPr lang="en-CA" altLang="en-US" sz="2740" dirty="0"/>
+              <a:t>Instead of looking at the values at each pointer, we look at the values in between the two pointers</a:t>
+            </a:r>
+            <a:endParaRPr lang="en-CA" altLang="en-US" sz="2740" dirty="0"/>
+          </a:p>
+          <a:p>
+            <a:pPr lvl="0"/>
+            <a:r>
+              <a:rPr lang="en-CA" altLang="en-US" sz="3195" dirty="0"/>
+              <a:t>We move the window (incrementing either pointer) whilst maintaining a certain invariant</a:t>
+            </a:r>
+            <a:endParaRPr lang="en-CA" altLang="en-US" sz="3195" dirty="0"/>
+          </a:p>
+          <a:p>
+            <a:pPr lvl="1"/>
+            <a:r>
+              <a:rPr lang="en-CA" altLang="en-US" sz="2735" dirty="0"/>
+              <a:t>The “invariant” is the condition we’re looking to satisfy for a given problem</a:t>
+            </a:r>
+            <a:endParaRPr lang="en-CA" altLang="en-US" sz="2735" dirty="0"/>
           </a:p>
         </p:txBody>
       </p:sp>
@@ -9778,54 +9895,6 @@
           </a:p>
         </p:txBody>
       </p:sp>
-      <p:sp>
-        <p:nvSpPr>
-          <p:cNvPr id="20" name="文本框 47"/>
-          <p:cNvSpPr txBox="1"/>
-          <p:nvPr/>
-        </p:nvSpPr>
-        <p:spPr>
-          <a:xfrm>
-            <a:off x="2167255" y="3786505"/>
-            <a:ext cx="5047615" cy="398780"/>
-          </a:xfrm>
-          <a:prstGeom prst="rect">
-            <a:avLst/>
-          </a:prstGeom>
-          <a:noFill/>
-          <a:ln w="9525">
-            <a:noFill/>
-          </a:ln>
-        </p:spPr>
-        <p:txBody>
-          <a:bodyPr wrap="square" anchor="t" anchorCtr="0">
-            <a:spAutoFit/>
-          </a:bodyPr>
-          <a:lstStyle/>
-          <a:p>
-            <a:pPr>
-              <a:buFont typeface="Arial" panose="020B0604020202020204" pitchFamily="34" charset="0"/>
-            </a:pPr>
-            <a:r>
-              <a:rPr lang="en-US" altLang="zh-CN" sz="2000" b="1" dirty="0" err="1">
-                <a:solidFill>
-                  <a:srgbClr val="05B780"/>
-                </a:solidFill>
-                <a:latin typeface="Microsoft YaHei" panose="020B0503020204020204" pitchFamily="34" charset="-122"/>
-                <a:ea typeface="Microsoft YaHei" panose="020B0503020204020204" pitchFamily="34" charset="-122"/>
-              </a:rPr>
-              <a:t>Two Pointers &amp; Sliding Window</a:t>
-            </a:r>
-            <a:endParaRPr lang="en-US" altLang="zh-CN" sz="2000" b="1" dirty="0" err="1">
-              <a:solidFill>
-                <a:srgbClr val="05B780"/>
-              </a:solidFill>
-              <a:latin typeface="Microsoft YaHei" panose="020B0503020204020204" pitchFamily="34" charset="-122"/>
-              <a:ea typeface="Microsoft YaHei" panose="020B0503020204020204" pitchFamily="34" charset="-122"/>
-            </a:endParaRPr>
-          </a:p>
-        </p:txBody>
-      </p:sp>
       <p:grpSp>
         <p:nvGrpSpPr>
           <p:cNvPr id="21" name="组合 3"/>
@@ -9966,6 +10035,53 @@
           </p:txBody>
         </p:sp>
       </p:grpSp>
+      <p:sp>
+        <p:nvSpPr>
+          <p:cNvPr id="2" name="文本框 47"/>
+          <p:cNvSpPr txBox="1"/>
+          <p:nvPr/>
+        </p:nvSpPr>
+        <p:spPr>
+          <a:xfrm>
+            <a:off x="2157413" y="3786188"/>
+            <a:ext cx="2497137" cy="460375"/>
+          </a:xfrm>
+          <a:prstGeom prst="rect">
+            <a:avLst/>
+          </a:prstGeom>
+          <a:noFill/>
+          <a:ln w="9525">
+            <a:noFill/>
+          </a:ln>
+        </p:spPr>
+        <p:txBody>
+          <a:bodyPr wrap="square" anchor="t" anchorCtr="0">
+            <a:spAutoFit/>
+          </a:bodyPr>
+          <a:p>
+            <a:pPr>
+              <a:buFont typeface="Arial" panose="020B0604020202020204" pitchFamily="34" charset="0"/>
+            </a:pPr>
+            <a:r>
+              <a:rPr lang="en-CA" altLang="en-US" sz="2400" b="1" dirty="0">
+                <a:solidFill>
+                  <a:srgbClr val="05B780"/>
+                </a:solidFill>
+                <a:latin typeface="Microsoft YaHei" panose="020B0503020204020204" pitchFamily="34" charset="-122"/>
+                <a:ea typeface="Microsoft YaHei" panose="020B0503020204020204" pitchFamily="34" charset="-122"/>
+              </a:rPr>
+              <a:t>Two Pointers</a:t>
+            </a:r>
+            <a:endParaRPr lang="en-CA" altLang="en-US" sz="2400" b="1" dirty="0">
+              <a:solidFill>
+                <a:srgbClr val="05B780"/>
+              </a:solidFill>
+              <a:latin typeface="Microsoft YaHei" panose="020B0503020204020204" pitchFamily="34" charset="-122"/>
+              <a:ea typeface="Microsoft YaHei" panose="020B0503020204020204" pitchFamily="34" charset="-122"/>
+            </a:endParaRPr>
+          </a:p>
+        </p:txBody>
+      </p:sp>
     </p:spTree>
   </p:cSld>
   <p:clrMapOvr>
@@ -10300,7 +10416,23 @@
           <a:p>
             <a:r>
               <a:rPr lang="en-US" sz="3200" dirty="0"/>
-              <a:t>The two-pointer technique is not limited to arrays. Two pointer can be done on other structures, like linked list, as long as they are </a:t>
+              <a:t>The two-pointer technique is not limited to arrays. Two pointer can be done on other </a:t>
+            </a:r>
+            <a:r>
+              <a:rPr lang="en-CA" altLang="en-US" sz="3200" dirty="0"/>
+              <a:t>1D </a:t>
+            </a:r>
+            <a:r>
+              <a:rPr lang="en-US" sz="3200" dirty="0"/>
+              <a:t>structures</a:t>
+            </a:r>
+            <a:r>
+              <a:rPr lang="en-CA" altLang="en-US" sz="3200" dirty="0"/>
+              <a:t> </a:t>
+            </a:r>
+            <a:r>
+              <a:rPr lang="en-US" sz="3200" dirty="0"/>
+              <a:t>as long as they are </a:t>
             </a:r>
             <a:r>
               <a:rPr lang="en-US" sz="3200" b="1" dirty="0"/>
@@ -10313,7 +10445,12 @@
             <a:endParaRPr lang="en-US" sz="3200" dirty="0"/>
           </a:p>
           <a:p>
-            <a:endParaRPr lang="en-US" sz="3200" dirty="0"/>
+            <a:pPr lvl="1"/>
+            <a:r>
+              <a:rPr lang="en-CA" altLang="en-US" sz="2740" dirty="0"/>
+              <a:t>Ie. Linked Lists, 1D DAGs (Directed Acyclic Graphs)</a:t>
+            </a:r>
+            <a:endParaRPr lang="en-US" sz="2740" dirty="0"/>
           </a:p>
           <a:p>
             <a:endParaRPr lang="en-US" sz="3200" dirty="0"/>
@@ -11769,7 +11906,7 @@
               <a:defRPr/>
             </a:pPr>
             <a:r>
-              <a:rPr lang="en-US" sz="3600" dirty="0">
+              <a:rPr lang="en-US" sz="3600" b="1" dirty="0">
                 <a:sym typeface="+mn-ea"/>
               </a:rPr>
               <a:t>Best Time to Buy and Sell Stock</a:t>
@@ -12133,7 +12270,7 @@
               <a:defRPr/>
             </a:pPr>
             <a:r>
-              <a:rPr lang="en-US" sz="3600" dirty="0">
+              <a:rPr lang="en-US" sz="3600" b="1" dirty="0">
                 <a:sym typeface="+mn-ea"/>
               </a:rPr>
               <a:t>Prefix Sum: Subarray Sum Problem</a:t>
@@ -12508,7 +12645,28 @@
               </a:rPr>
               <a:t>Homework</a:t>
             </a:r>
-            <a:endParaRPr kumimoji="0" lang="en-US" altLang="zh-CN" sz="2800" b="1" i="0" u="none" strike="noStrike" kern="1200" cap="none" spc="0" normalizeH="0" baseline="0" noProof="0" dirty="0">
+            <a:r>
+              <a:rPr kumimoji="0" lang="en-CA" altLang="en-US" sz="2800" b="1" i="0" u="none" strike="noStrike" kern="1200" cap="none" spc="0" normalizeH="0" baseline="0" noProof="0" dirty="0">
+                <a:ln>
+                  <a:noFill/>
+                </a:ln>
+                <a:solidFill>
+                  <a:schemeClr val="tx1">
+                    <a:lumMod val="85000"/>
+                    <a:lumOff val="15000"/>
+                  </a:schemeClr>
+                </a:solidFill>
+                <a:effectLst/>
+                <a:uLnTx/>
+                <a:uFillTx/>
+                <a:latin typeface="Microsoft YaHei" panose="020B0503020204020204" pitchFamily="34" charset="-122"/>
+                <a:ea typeface="Microsoft YaHei" panose="020B0503020204020204" pitchFamily="34" charset="-122"/>
+                <a:cs typeface="+mn-cs"/>
+                <a:sym typeface="+mn-ea"/>
+              </a:rPr>
+              <a:t> - Revisit Unique Elements in Array</a:t>
+            </a:r>
+            <a:endParaRPr kumimoji="0" lang="en-CA" altLang="en-US" sz="2800" b="1" i="0" u="none" strike="noStrike" kern="1200" cap="none" spc="0" normalizeH="0" baseline="0" noProof="0" dirty="0">
               <a:ln>
                 <a:noFill/>
               </a:ln>
@@ -12569,7 +12727,11 @@
               <a:rPr lang="en-US" sz="2740" dirty="0"/>
               <a:t>Constraint: Must solve in less than O(n) time</a:t>
             </a:r>
-            <a:endParaRPr lang="en-US" sz="2740" dirty="0"/>
+            <a:r>
+              <a:rPr lang="en-CA" altLang="en-US" sz="2740" dirty="0"/>
+              <a:t> where n is number of elements in array</a:t>
+            </a:r>
+            <a:endParaRPr lang="en-CA" altLang="en-US" sz="2740" dirty="0"/>
           </a:p>
           <a:p>
             <a:pPr lvl="1"/>
@@ -14577,7 +14739,49 @@
                 <a:cs typeface="+mn-cs"/>
                 <a:sym typeface="+mn-ea"/>
               </a:rPr>
-              <a:t>Week4 Recap</a:t>
+              <a:t>Week</a:t>
+            </a:r>
+            <a:r>
+              <a:rPr kumimoji="0" lang="en-CA" altLang="en-US" sz="2800" b="1" i="0" u="none" strike="noStrike" kern="1200" cap="none" spc="0" normalizeH="0" baseline="0" noProof="0" dirty="0">
+                <a:ln>
+                  <a:noFill/>
+                </a:ln>
+                <a:solidFill>
+                  <a:schemeClr val="tx1">
+                    <a:lumMod val="85000"/>
+                    <a:lumOff val="15000"/>
+                  </a:schemeClr>
+                </a:solidFill>
+                <a:effectLst/>
+                <a:uLnTx/>
+                <a:uFillTx/>
+                <a:latin typeface="Microsoft YaHei" panose="020B0503020204020204" pitchFamily="34" charset="-122"/>
+                <a:ea typeface="Microsoft YaHei" panose="020B0503020204020204" pitchFamily="34" charset="-122"/>
+                <a:cs typeface="+mn-cs"/>
+                <a:sym typeface="+mn-ea"/>
+              </a:rPr>
+              <a:t>5</a:t>
+            </a:r>
+            <a:r>
+              <a:rPr kumimoji="0" lang="en-US" altLang="zh-CN" sz="2800" b="1" i="0" u="none" strike="noStrike" kern="1200" cap="none" spc="0" normalizeH="0" baseline="0" noProof="0" dirty="0">
+                <a:ln>
+                  <a:noFill/>
+                </a:ln>
+                <a:solidFill>
+                  <a:schemeClr val="tx1">
+                    <a:lumMod val="85000"/>
+                    <a:lumOff val="15000"/>
+                  </a:schemeClr>
+                </a:solidFill>
+                <a:effectLst/>
+                <a:uLnTx/>
+                <a:uFillTx/>
+                <a:latin typeface="Microsoft YaHei" panose="020B0503020204020204" pitchFamily="34" charset="-122"/>
+                <a:ea typeface="Microsoft YaHei" panose="020B0503020204020204" pitchFamily="34" charset="-122"/>
+                <a:cs typeface="+mn-cs"/>
+                <a:sym typeface="+mn-ea"/>
+              </a:rPr>
+              <a:t> Recap</a:t>
             </a:r>
             <a:endParaRPr kumimoji="0" lang="en-US" altLang="zh-CN" sz="2800" b="1" i="0" u="none" strike="noStrike" kern="1200" cap="none" spc="0" normalizeH="0" baseline="0" noProof="0" dirty="0">
               <a:ln>
@@ -16733,7 +16937,15 @@
             <a:pPr lvl="1"/>
             <a:r>
               <a:rPr lang="en-US" sz="2740" dirty="0"/>
-              <a:t>Given a sorted array of integers and an integer called target, find the element that equals the target and return its index. If the element is not found, return -1.</a:t>
+              <a:t>Given a sorted array of integers and an integer called target, find the element that equals the target and return its index. If the element is not found, return -1</a:t>
+            </a:r>
+            <a:endParaRPr lang="en-US" sz="2740" dirty="0"/>
+          </a:p>
+          <a:p>
+            <a:pPr lvl="1"/>
+            <a:r>
+              <a:rPr lang="en-CA" altLang="en-US" sz="2740" dirty="0"/>
+              <a:t>We want to do this without looking through the entire array (we want less than O(n) time complexity)</a:t>
             </a:r>
             <a:endParaRPr lang="en-US" sz="2740" dirty="0"/>
           </a:p>

</xml_diff>